<commit_message>
uploaded new sketchs for motor line
</commit_message>
<xml_diff>
--- a/Kreuz.pptx
+++ b/Kreuz.pptx
@@ -104,6 +104,11 @@
       </a:defRPr>
     </a:lvl9pPr>
   </p:defaultTextStyle>
+  <p:extLst>
+    <p:ext uri="{EFAFB233-063F-42B5-8137-9DF3F51BA10A}">
+      <p15:sldGuideLst xmlns:p15="http://schemas.microsoft.com/office/powerpoint/2012/main"/>
+    </p:ext>
+  </p:extLst>
 </p:presentation>
 </file>
 
@@ -256,7 +261,7 @@
           <a:p>
             <a:fld id="{A6AB00F4-31B5-493F-B5EC-A29541E519CB}" type="datetimeFigureOut">
               <a:rPr lang="LID4096" smtClean="0"/>
-              <a:t>03/11/2023</a:t>
+              <a:t>03/18/2023</a:t>
             </a:fld>
             <a:endParaRPr lang="LID4096"/>
           </a:p>
@@ -456,7 +461,7 @@
           <a:p>
             <a:fld id="{A6AB00F4-31B5-493F-B5EC-A29541E519CB}" type="datetimeFigureOut">
               <a:rPr lang="LID4096" smtClean="0"/>
-              <a:t>03/11/2023</a:t>
+              <a:t>03/18/2023</a:t>
             </a:fld>
             <a:endParaRPr lang="LID4096"/>
           </a:p>
@@ -666,7 +671,7 @@
           <a:p>
             <a:fld id="{A6AB00F4-31B5-493F-B5EC-A29541E519CB}" type="datetimeFigureOut">
               <a:rPr lang="LID4096" smtClean="0"/>
-              <a:t>03/11/2023</a:t>
+              <a:t>03/18/2023</a:t>
             </a:fld>
             <a:endParaRPr lang="LID4096"/>
           </a:p>
@@ -866,7 +871,7 @@
           <a:p>
             <a:fld id="{A6AB00F4-31B5-493F-B5EC-A29541E519CB}" type="datetimeFigureOut">
               <a:rPr lang="LID4096" smtClean="0"/>
-              <a:t>03/11/2023</a:t>
+              <a:t>03/18/2023</a:t>
             </a:fld>
             <a:endParaRPr lang="LID4096"/>
           </a:p>
@@ -1142,7 +1147,7 @@
           <a:p>
             <a:fld id="{A6AB00F4-31B5-493F-B5EC-A29541E519CB}" type="datetimeFigureOut">
               <a:rPr lang="LID4096" smtClean="0"/>
-              <a:t>03/11/2023</a:t>
+              <a:t>03/18/2023</a:t>
             </a:fld>
             <a:endParaRPr lang="LID4096"/>
           </a:p>
@@ -1410,7 +1415,7 @@
           <a:p>
             <a:fld id="{A6AB00F4-31B5-493F-B5EC-A29541E519CB}" type="datetimeFigureOut">
               <a:rPr lang="LID4096" smtClean="0"/>
-              <a:t>03/11/2023</a:t>
+              <a:t>03/18/2023</a:t>
             </a:fld>
             <a:endParaRPr lang="LID4096"/>
           </a:p>
@@ -1825,7 +1830,7 @@
           <a:p>
             <a:fld id="{A6AB00F4-31B5-493F-B5EC-A29541E519CB}" type="datetimeFigureOut">
               <a:rPr lang="LID4096" smtClean="0"/>
-              <a:t>03/11/2023</a:t>
+              <a:t>03/18/2023</a:t>
             </a:fld>
             <a:endParaRPr lang="LID4096"/>
           </a:p>
@@ -1967,7 +1972,7 @@
           <a:p>
             <a:fld id="{A6AB00F4-31B5-493F-B5EC-A29541E519CB}" type="datetimeFigureOut">
               <a:rPr lang="LID4096" smtClean="0"/>
-              <a:t>03/11/2023</a:t>
+              <a:t>03/18/2023</a:t>
             </a:fld>
             <a:endParaRPr lang="LID4096"/>
           </a:p>
@@ -2080,7 +2085,7 @@
           <a:p>
             <a:fld id="{A6AB00F4-31B5-493F-B5EC-A29541E519CB}" type="datetimeFigureOut">
               <a:rPr lang="LID4096" smtClean="0"/>
-              <a:t>03/11/2023</a:t>
+              <a:t>03/18/2023</a:t>
             </a:fld>
             <a:endParaRPr lang="LID4096"/>
           </a:p>
@@ -2393,7 +2398,7 @@
           <a:p>
             <a:fld id="{A6AB00F4-31B5-493F-B5EC-A29541E519CB}" type="datetimeFigureOut">
               <a:rPr lang="LID4096" smtClean="0"/>
-              <a:t>03/11/2023</a:t>
+              <a:t>03/18/2023</a:t>
             </a:fld>
             <a:endParaRPr lang="LID4096"/>
           </a:p>
@@ -2682,7 +2687,7 @@
           <a:p>
             <a:fld id="{A6AB00F4-31B5-493F-B5EC-A29541E519CB}" type="datetimeFigureOut">
               <a:rPr lang="LID4096" smtClean="0"/>
-              <a:t>03/11/2023</a:t>
+              <a:t>03/18/2023</a:t>
             </a:fld>
             <a:endParaRPr lang="LID4096"/>
           </a:p>
@@ -2925,7 +2930,7 @@
           <a:p>
             <a:fld id="{A6AB00F4-31B5-493F-B5EC-A29541E519CB}" type="datetimeFigureOut">
               <a:rPr lang="LID4096" smtClean="0"/>
-              <a:t>03/11/2023</a:t>
+              <a:t>03/18/2023</a:t>
             </a:fld>
             <a:endParaRPr lang="LID4096"/>
           </a:p>
@@ -3535,6 +3540,130 @@
           </a:p>
         </p:txBody>
       </p:sp>
+      <mc:AlternateContent xmlns:mc="http://schemas.openxmlformats.org/markup-compatibility/2006">
+        <mc:Choice xmlns:am3d="http://schemas.microsoft.com/office/drawing/2017/model3d" Requires="am3d">
+          <p:graphicFrame>
+            <p:nvGraphicFramePr>
+              <p:cNvPr id="3" name="3D-Modell 2" descr="Hellgraue Kugel">
+                <a:extLst>
+                  <a:ext uri="{FF2B5EF4-FFF2-40B4-BE49-F238E27FC236}">
+                    <a16:creationId xmlns:a16="http://schemas.microsoft.com/office/drawing/2014/main" id="{02FDFC3C-F117-4614-AD44-E4D1D22C1795}"/>
+                  </a:ext>
+                </a:extLst>
+              </p:cNvPr>
+              <p:cNvGraphicFramePr>
+                <a:graphicFrameLocks noChangeAspect="1"/>
+              </p:cNvGraphicFramePr>
+              <p:nvPr>
+                <p:extLst>
+                  <p:ext uri="{D42A27DB-BD31-4B8C-83A1-F6EECF244321}">
+                    <p14:modId xmlns:p14="http://schemas.microsoft.com/office/powerpoint/2010/main" val="3172469048"/>
+                  </p:ext>
+                </p:extLst>
+              </p:nvPr>
+            </p:nvGraphicFramePr>
+            <p:xfrm>
+              <a:off x="5003779" y="1822972"/>
+              <a:ext cx="3037880" cy="3037881"/>
+            </p:xfrm>
+            <a:graphic>
+              <a:graphicData uri="http://schemas.microsoft.com/office/drawing/2017/model3d">
+                <am3d:model3d r:embed="rId2">
+                  <am3d:spPr>
+                    <a:xfrm>
+                      <a:off x="0" y="0"/>
+                      <a:ext cx="3037880" cy="3037881"/>
+                    </a:xfrm>
+                    <a:prstGeom prst="rect">
+                      <a:avLst/>
+                    </a:prstGeom>
+                  </am3d:spPr>
+                  <am3d:camera>
+                    <am3d:pos x="0" y="0" z="81469184"/>
+                    <am3d:up dx="0" dy="36000000" dz="0"/>
+                    <am3d:lookAt x="0" y="0" z="0"/>
+                    <am3d:perspective fov="2700000"/>
+                  </am3d:camera>
+                  <am3d:trans>
+                    <am3d:meterPerModelUnit n="7143146" d="1000000"/>
+                    <am3d:preTrans dx="-2" dy="-18000000" dz="3"/>
+                    <am3d:scale>
+                      <am3d:sx n="1000000" d="1000000"/>
+                      <am3d:sy n="1000000" d="1000000"/>
+                      <am3d:sz n="1000000" d="1000000"/>
+                    </am3d:scale>
+                    <am3d:rot ax="-22802" ay="2081246" az="-12970"/>
+                    <am3d:postTrans dx="0" dy="0" dz="0"/>
+                  </am3d:trans>
+                  <am3d:raster rName="Office3DRenderer" rVer="16.0.8326">
+                    <am3d:blip r:embed="rId3"/>
+                  </am3d:raster>
+                  <am3d:objViewport viewportSz="5418664"/>
+                  <am3d:ambientLight>
+                    <am3d:clr>
+                      <a:scrgbClr r="50000" g="50000" b="50000"/>
+                    </am3d:clr>
+                    <am3d:illuminance n="500000" d="1000000"/>
+                  </am3d:ambientLight>
+                  <am3d:ptLight rad="0">
+                    <am3d:clr>
+                      <a:scrgbClr r="100000" g="75000" b="50000"/>
+                    </am3d:clr>
+                    <am3d:intensity n="9765625" d="1000000"/>
+                    <am3d:pos x="21959998" y="70920001" z="16344003"/>
+                  </am3d:ptLight>
+                  <am3d:ptLight rad="0">
+                    <am3d:clr>
+                      <a:scrgbClr r="40000" g="60000" b="95000"/>
+                    </am3d:clr>
+                    <am3d:intensity n="12250000" d="1000000"/>
+                    <am3d:pos x="-37964106" y="51130435" z="57631972"/>
+                  </am3d:ptLight>
+                  <am3d:ptLight rad="0">
+                    <am3d:clr>
+                      <a:scrgbClr r="86837" g="72700" b="100000"/>
+                    </am3d:clr>
+                    <am3d:intensity n="3125000" d="1000000"/>
+                    <am3d:pos x="-37739122" y="58056624" z="-34769649"/>
+                  </am3d:ptLight>
+                </am3d:model3d>
+              </a:graphicData>
+            </a:graphic>
+          </p:graphicFrame>
+        </mc:Choice>
+        <mc:Fallback>
+          <p:pic>
+            <p:nvPicPr>
+              <p:cNvPr id="3" name="3D-Modell 2" descr="Hellgraue Kugel">
+                <a:extLst>
+                  <a:ext uri="{FF2B5EF4-FFF2-40B4-BE49-F238E27FC236}">
+                    <a16:creationId xmlns:a16="http://schemas.microsoft.com/office/drawing/2014/main" id="{02FDFC3C-F117-4614-AD44-E4D1D22C1795}"/>
+                  </a:ext>
+                </a:extLst>
+              </p:cNvPr>
+              <p:cNvPicPr>
+                <a:picLocks noGrp="1" noRot="1" noChangeAspect="1" noMove="1" noResize="1" noEditPoints="1" noAdjustHandles="1" noChangeArrowheads="1" noChangeShapeType="1" noCrop="1"/>
+              </p:cNvPicPr>
+              <p:nvPr/>
+            </p:nvPicPr>
+            <p:blipFill>
+              <a:blip r:embed="rId3"/>
+              <a:stretch>
+                <a:fillRect/>
+              </a:stretch>
+            </p:blipFill>
+            <p:spPr>
+              <a:xfrm>
+                <a:off x="5003779" y="1822972"/>
+                <a:ext cx="3037880" cy="3037881"/>
+              </a:xfrm>
+              <a:prstGeom prst="rect">
+                <a:avLst/>
+              </a:prstGeom>
+            </p:spPr>
+          </p:pic>
+        </mc:Fallback>
+      </mc:AlternateContent>
     </p:spTree>
     <p:extLst>
       <p:ext uri="{BB962C8B-B14F-4D97-AF65-F5344CB8AC3E}">

</xml_diff>